<commit_message>
Temporary update - more details to be added
</commit_message>
<xml_diff>
--- a/random_split_predictions_combined_plot.pptx
+++ b/random_split_predictions_combined_plot.pptx
@@ -6,6 +6,8 @@
   </p:sldMasterIdLst>
   <p:sldIdLst>
     <p:sldId id="257" r:id="rId2"/>
+    <p:sldId id="259" r:id="rId3"/>
+    <p:sldId id="258" r:id="rId4"/>
   </p:sldIdLst>
   <p:sldSz cx="18288000" cy="6858000"/>
   <p:notesSz cx="6858000" cy="9144000"/>
@@ -254,7 +256,7 @@
           <a:p>
             <a:fld id="{013158BD-E8C4-44EF-B132-60B39776B622}" type="datetimeFigureOut">
               <a:rPr lang="en-US" smtClean="0"/>
-              <a:t>4/14/2025</a:t>
+              <a:t>4/15/2025</a:t>
             </a:fld>
             <a:endParaRPr lang="en-US"/>
           </a:p>
@@ -424,7 +426,7 @@
           <a:p>
             <a:fld id="{013158BD-E8C4-44EF-B132-60B39776B622}" type="datetimeFigureOut">
               <a:rPr lang="en-US" smtClean="0"/>
-              <a:t>4/14/2025</a:t>
+              <a:t>4/15/2025</a:t>
             </a:fld>
             <a:endParaRPr lang="en-US"/>
           </a:p>
@@ -604,7 +606,7 @@
           <a:p>
             <a:fld id="{013158BD-E8C4-44EF-B132-60B39776B622}" type="datetimeFigureOut">
               <a:rPr lang="en-US" smtClean="0"/>
-              <a:t>4/14/2025</a:t>
+              <a:t>4/15/2025</a:t>
             </a:fld>
             <a:endParaRPr lang="en-US"/>
           </a:p>
@@ -774,7 +776,7 @@
           <a:p>
             <a:fld id="{013158BD-E8C4-44EF-B132-60B39776B622}" type="datetimeFigureOut">
               <a:rPr lang="en-US" smtClean="0"/>
-              <a:t>4/14/2025</a:t>
+              <a:t>4/15/2025</a:t>
             </a:fld>
             <a:endParaRPr lang="en-US"/>
           </a:p>
@@ -1020,7 +1022,7 @@
           <a:p>
             <a:fld id="{013158BD-E8C4-44EF-B132-60B39776B622}" type="datetimeFigureOut">
               <a:rPr lang="en-US" smtClean="0"/>
-              <a:t>4/14/2025</a:t>
+              <a:t>4/15/2025</a:t>
             </a:fld>
             <a:endParaRPr lang="en-US"/>
           </a:p>
@@ -1252,7 +1254,7 @@
           <a:p>
             <a:fld id="{013158BD-E8C4-44EF-B132-60B39776B622}" type="datetimeFigureOut">
               <a:rPr lang="en-US" smtClean="0"/>
-              <a:t>4/14/2025</a:t>
+              <a:t>4/15/2025</a:t>
             </a:fld>
             <a:endParaRPr lang="en-US"/>
           </a:p>
@@ -1619,7 +1621,7 @@
           <a:p>
             <a:fld id="{013158BD-E8C4-44EF-B132-60B39776B622}" type="datetimeFigureOut">
               <a:rPr lang="en-US" smtClean="0"/>
-              <a:t>4/14/2025</a:t>
+              <a:t>4/15/2025</a:t>
             </a:fld>
             <a:endParaRPr lang="en-US"/>
           </a:p>
@@ -1737,7 +1739,7 @@
           <a:p>
             <a:fld id="{013158BD-E8C4-44EF-B132-60B39776B622}" type="datetimeFigureOut">
               <a:rPr lang="en-US" smtClean="0"/>
-              <a:t>4/14/2025</a:t>
+              <a:t>4/15/2025</a:t>
             </a:fld>
             <a:endParaRPr lang="en-US"/>
           </a:p>
@@ -1832,7 +1834,7 @@
           <a:p>
             <a:fld id="{013158BD-E8C4-44EF-B132-60B39776B622}" type="datetimeFigureOut">
               <a:rPr lang="en-US" smtClean="0"/>
-              <a:t>4/14/2025</a:t>
+              <a:t>4/15/2025</a:t>
             </a:fld>
             <a:endParaRPr lang="en-US"/>
           </a:p>
@@ -2109,7 +2111,7 @@
           <a:p>
             <a:fld id="{013158BD-E8C4-44EF-B132-60B39776B622}" type="datetimeFigureOut">
               <a:rPr lang="en-US" smtClean="0"/>
-              <a:t>4/14/2025</a:t>
+              <a:t>4/15/2025</a:t>
             </a:fld>
             <a:endParaRPr lang="en-US"/>
           </a:p>
@@ -2366,7 +2368,7 @@
           <a:p>
             <a:fld id="{013158BD-E8C4-44EF-B132-60B39776B622}" type="datetimeFigureOut">
               <a:rPr lang="en-US" smtClean="0"/>
-              <a:t>4/14/2025</a:t>
+              <a:t>4/15/2025</a:t>
             </a:fld>
             <a:endParaRPr lang="en-US"/>
           </a:p>
@@ -2579,7 +2581,7 @@
           <a:p>
             <a:fld id="{013158BD-E8C4-44EF-B132-60B39776B622}" type="datetimeFigureOut">
               <a:rPr lang="en-US" smtClean="0"/>
-              <a:t>4/14/2025</a:t>
+              <a:t>4/15/2025</a:t>
             </a:fld>
             <a:endParaRPr lang="en-US"/>
           </a:p>
@@ -3069,6 +3071,288 @@
 </p:sld>
 </file>
 
+<file path=ppt/slides/slide2.xml><?xml version="1.0" encoding="utf-8"?>
+<p:sld xmlns:a="http://schemas.openxmlformats.org/drawingml/2006/main" xmlns:r="http://schemas.openxmlformats.org/officeDocument/2006/relationships" xmlns:p="http://schemas.openxmlformats.org/presentationml/2006/main" show="0">
+  <p:cSld>
+    <p:spTree>
+      <p:nvGrpSpPr>
+        <p:cNvPr id="1" name="">
+          <a:extLst>
+            <a:ext uri="{FF2B5EF4-FFF2-40B4-BE49-F238E27FC236}">
+              <a16:creationId xmlns:a16="http://schemas.microsoft.com/office/drawing/2014/main" id="{B309C732-F29A-81AF-4A49-D81939B12A2B}"/>
+            </a:ext>
+          </a:extLst>
+        </p:cNvPr>
+        <p:cNvGrpSpPr/>
+        <p:nvPr/>
+      </p:nvGrpSpPr>
+      <p:grpSpPr>
+        <a:xfrm>
+          <a:off x="0" y="0"/>
+          <a:ext cx="0" cy="0"/>
+          <a:chOff x="0" y="0"/>
+          <a:chExt cx="0" cy="0"/>
+        </a:xfrm>
+      </p:grpSpPr>
+      <p:pic>
+        <p:nvPicPr>
+          <p:cNvPr id="5" name="Picture 4">
+            <a:extLst>
+              <a:ext uri="{FF2B5EF4-FFF2-40B4-BE49-F238E27FC236}">
+                <a16:creationId xmlns:a16="http://schemas.microsoft.com/office/drawing/2014/main" id="{8D686AF4-7CB6-DBE0-4074-A6E1A4BC9DBE}"/>
+              </a:ext>
+            </a:extLst>
+          </p:cNvPr>
+          <p:cNvPicPr>
+            <a:picLocks noChangeAspect="1"/>
+          </p:cNvPicPr>
+          <p:nvPr/>
+        </p:nvPicPr>
+        <p:blipFill>
+          <a:blip r:embed="rId2">
+            <a:extLst>
+              <a:ext uri="{28A0092B-C50C-407E-A947-70E740481C1C}">
+                <a14:useLocalDpi xmlns:a14="http://schemas.microsoft.com/office/drawing/2010/main" val="0"/>
+              </a:ext>
+            </a:extLst>
+          </a:blip>
+          <a:stretch>
+            <a:fillRect/>
+          </a:stretch>
+        </p:blipFill>
+        <p:spPr>
+          <a:xfrm>
+            <a:off x="247651" y="649034"/>
+            <a:ext cx="7352434" cy="5878766"/>
+          </a:xfrm>
+          <a:prstGeom prst="rect">
+            <a:avLst/>
+          </a:prstGeom>
+        </p:spPr>
+      </p:pic>
+      <p:pic>
+        <p:nvPicPr>
+          <p:cNvPr id="9" name="Picture 8" descr="A screenshot of a graph&#10;&#10;AI-generated content may be incorrect.">
+            <a:extLst>
+              <a:ext uri="{FF2B5EF4-FFF2-40B4-BE49-F238E27FC236}">
+                <a16:creationId xmlns:a16="http://schemas.microsoft.com/office/drawing/2014/main" id="{1B0A1028-CA30-50C8-6150-139096013B6E}"/>
+              </a:ext>
+            </a:extLst>
+          </p:cNvPr>
+          <p:cNvPicPr>
+            <a:picLocks noChangeAspect="1"/>
+          </p:cNvPicPr>
+          <p:nvPr/>
+        </p:nvPicPr>
+        <p:blipFill>
+          <a:blip r:embed="rId3">
+            <a:extLst>
+              <a:ext uri="{28A0092B-C50C-407E-A947-70E740481C1C}">
+                <a14:useLocalDpi xmlns:a14="http://schemas.microsoft.com/office/drawing/2010/main" val="0"/>
+              </a:ext>
+            </a:extLst>
+          </a:blip>
+          <a:stretch>
+            <a:fillRect/>
+          </a:stretch>
+        </p:blipFill>
+        <p:spPr>
+          <a:xfrm>
+            <a:off x="7517535" y="330200"/>
+            <a:ext cx="10285066" cy="6600450"/>
+          </a:xfrm>
+          <a:prstGeom prst="rect">
+            <a:avLst/>
+          </a:prstGeom>
+        </p:spPr>
+      </p:pic>
+      <p:pic>
+        <p:nvPicPr>
+          <p:cNvPr id="2" name="Picture 1" descr="A graph of a graph with red and blue dots&#10;&#10;AI-generated content may be incorrect.">
+            <a:extLst>
+              <a:ext uri="{FF2B5EF4-FFF2-40B4-BE49-F238E27FC236}">
+                <a16:creationId xmlns:a16="http://schemas.microsoft.com/office/drawing/2014/main" id="{AD1F34F0-3C0C-814A-9F2A-0A226E4CA387}"/>
+              </a:ext>
+            </a:extLst>
+          </p:cNvPr>
+          <p:cNvPicPr>
+            <a:picLocks noChangeAspect="1"/>
+          </p:cNvPicPr>
+          <p:nvPr/>
+        </p:nvPicPr>
+        <p:blipFill>
+          <a:blip r:embed="rId4">
+            <a:extLst>
+              <a:ext uri="{28A0092B-C50C-407E-A947-70E740481C1C}">
+                <a14:useLocalDpi xmlns:a14="http://schemas.microsoft.com/office/drawing/2010/main" val="0"/>
+              </a:ext>
+            </a:extLst>
+          </a:blip>
+          <a:stretch>
+            <a:fillRect/>
+          </a:stretch>
+        </p:blipFill>
+        <p:spPr>
+          <a:xfrm>
+            <a:off x="394305" y="583409"/>
+            <a:ext cx="7353467" cy="5879592"/>
+          </a:xfrm>
+          <a:prstGeom prst="rect">
+            <a:avLst/>
+          </a:prstGeom>
+        </p:spPr>
+      </p:pic>
+      <p:pic>
+        <p:nvPicPr>
+          <p:cNvPr id="3" name="Picture 2" descr="A screenshot of a graph&#10;&#10;AI-generated content may be incorrect.">
+            <a:extLst>
+              <a:ext uri="{FF2B5EF4-FFF2-40B4-BE49-F238E27FC236}">
+                <a16:creationId xmlns:a16="http://schemas.microsoft.com/office/drawing/2014/main" id="{55E6C306-2F2F-31B5-8867-BF4653871D38}"/>
+              </a:ext>
+            </a:extLst>
+          </p:cNvPr>
+          <p:cNvPicPr>
+            <a:picLocks noChangeAspect="1"/>
+          </p:cNvPicPr>
+          <p:nvPr/>
+        </p:nvPicPr>
+        <p:blipFill>
+          <a:blip r:embed="rId5">
+            <a:extLst>
+              <a:ext uri="{28A0092B-C50C-407E-A947-70E740481C1C}">
+                <a14:useLocalDpi xmlns:a14="http://schemas.microsoft.com/office/drawing/2010/main" val="0"/>
+              </a:ext>
+            </a:extLst>
+          </a:blip>
+          <a:stretch>
+            <a:fillRect/>
+          </a:stretch>
+        </p:blipFill>
+        <p:spPr>
+          <a:xfrm>
+            <a:off x="7810545" y="150484"/>
+            <a:ext cx="10287431" cy="6601968"/>
+          </a:xfrm>
+          <a:prstGeom prst="rect">
+            <a:avLst/>
+          </a:prstGeom>
+        </p:spPr>
+      </p:pic>
+    </p:spTree>
+    <p:extLst>
+      <p:ext uri="{BB962C8B-B14F-4D97-AF65-F5344CB8AC3E}">
+        <p14:creationId xmlns:p14="http://schemas.microsoft.com/office/powerpoint/2010/main" val="1159565613"/>
+      </p:ext>
+    </p:extLst>
+  </p:cSld>
+  <p:clrMapOvr>
+    <a:masterClrMapping/>
+  </p:clrMapOvr>
+</p:sld>
+</file>
+
+<file path=ppt/slides/slide3.xml><?xml version="1.0" encoding="utf-8"?>
+<p:sld xmlns:a="http://schemas.openxmlformats.org/drawingml/2006/main" xmlns:r="http://schemas.openxmlformats.org/officeDocument/2006/relationships" xmlns:p="http://schemas.openxmlformats.org/presentationml/2006/main">
+  <p:cSld>
+    <p:spTree>
+      <p:nvGrpSpPr>
+        <p:cNvPr id="1" name=""/>
+        <p:cNvGrpSpPr/>
+        <p:nvPr/>
+      </p:nvGrpSpPr>
+      <p:grpSpPr>
+        <a:xfrm>
+          <a:off x="0" y="0"/>
+          <a:ext cx="0" cy="0"/>
+          <a:chOff x="0" y="0"/>
+          <a:chExt cx="0" cy="0"/>
+        </a:xfrm>
+      </p:grpSpPr>
+      <p:pic>
+        <p:nvPicPr>
+          <p:cNvPr id="5" name="Picture 4" descr="A graph of a graph with red and blue dots&#10;&#10;AI-generated content may be incorrect.">
+            <a:extLst>
+              <a:ext uri="{FF2B5EF4-FFF2-40B4-BE49-F238E27FC236}">
+                <a16:creationId xmlns:a16="http://schemas.microsoft.com/office/drawing/2014/main" id="{20EB32A8-A88A-C97D-FEB8-0656356829E2}"/>
+              </a:ext>
+            </a:extLst>
+          </p:cNvPr>
+          <p:cNvPicPr>
+            <a:picLocks noChangeAspect="1"/>
+          </p:cNvPicPr>
+          <p:nvPr/>
+        </p:nvPicPr>
+        <p:blipFill>
+          <a:blip r:embed="rId2">
+            <a:extLst>
+              <a:ext uri="{28A0092B-C50C-407E-A947-70E740481C1C}">
+                <a14:useLocalDpi xmlns:a14="http://schemas.microsoft.com/office/drawing/2010/main" val="0"/>
+              </a:ext>
+            </a:extLst>
+          </a:blip>
+          <a:stretch>
+            <a:fillRect/>
+          </a:stretch>
+        </p:blipFill>
+        <p:spPr>
+          <a:xfrm>
+            <a:off x="397873" y="550517"/>
+            <a:ext cx="7353467" cy="5879592"/>
+          </a:xfrm>
+          <a:prstGeom prst="rect">
+            <a:avLst/>
+          </a:prstGeom>
+        </p:spPr>
+      </p:pic>
+      <p:pic>
+        <p:nvPicPr>
+          <p:cNvPr id="7" name="Picture 6" descr="A screenshot of a graph&#10;&#10;AI-generated content may be incorrect.">
+            <a:extLst>
+              <a:ext uri="{FF2B5EF4-FFF2-40B4-BE49-F238E27FC236}">
+                <a16:creationId xmlns:a16="http://schemas.microsoft.com/office/drawing/2014/main" id="{989208BB-B570-28FF-ECBF-FDE4AAB38E3B}"/>
+              </a:ext>
+            </a:extLst>
+          </p:cNvPr>
+          <p:cNvPicPr>
+            <a:picLocks noChangeAspect="1"/>
+          </p:cNvPicPr>
+          <p:nvPr/>
+        </p:nvPicPr>
+        <p:blipFill>
+          <a:blip r:embed="rId3">
+            <a:extLst>
+              <a:ext uri="{28A0092B-C50C-407E-A947-70E740481C1C}">
+                <a14:useLocalDpi xmlns:a14="http://schemas.microsoft.com/office/drawing/2010/main" val="0"/>
+              </a:ext>
+            </a:extLst>
+          </a:blip>
+          <a:stretch>
+            <a:fillRect/>
+          </a:stretch>
+        </p:blipFill>
+        <p:spPr>
+          <a:xfrm>
+            <a:off x="7817123" y="189329"/>
+            <a:ext cx="10287431" cy="6601968"/>
+          </a:xfrm>
+          <a:prstGeom prst="rect">
+            <a:avLst/>
+          </a:prstGeom>
+        </p:spPr>
+      </p:pic>
+    </p:spTree>
+    <p:extLst>
+      <p:ext uri="{BB962C8B-B14F-4D97-AF65-F5344CB8AC3E}">
+        <p14:creationId xmlns:p14="http://schemas.microsoft.com/office/powerpoint/2010/main" val="2593294166"/>
+      </p:ext>
+    </p:extLst>
+  </p:cSld>
+  <p:clrMapOvr>
+    <a:masterClrMapping/>
+  </p:clrMapOvr>
+</p:sld>
+</file>
+
 <file path=ppt/theme/theme1.xml><?xml version="1.0" encoding="utf-8"?>
 <a:theme xmlns:a="http://schemas.openxmlformats.org/drawingml/2006/main" name="Office Theme">
   <a:themeElements>

</xml_diff>